<commit_message>
added testing for requirements
</commit_message>
<xml_diff>
--- a/docs/CIS641_presentation_Hernandez.pptx
+++ b/docs/CIS641_presentation_Hernandez.pptx
@@ -133,6 +133,35 @@
 </p188:authorLst>
 </file>
 
+<file path=ppt/changesInfos/changesInfo1.xml><?xml version="1.0" encoding="utf-8"?>
+<pc:chgInfo xmlns:a="http://schemas.openxmlformats.org/drawingml/2006/main" xmlns:r="http://schemas.openxmlformats.org/officeDocument/2006/relationships" xmlns:ac="http://schemas.microsoft.com/office/drawing/2013/main/command" xmlns:pc="http://schemas.microsoft.com/office/powerpoint/2013/main/command">
+  <pc:docChgLst>
+    <pc:chgData name="Lupe Hernandez" userId="cc6101a617eae4d3" providerId="LiveId" clId="{624F5C8E-E1BF-4CE1-BB9B-76365F20EAEC}"/>
+    <pc:docChg chg="undo custSel modSld">
+      <pc:chgData name="Lupe Hernandez" userId="cc6101a617eae4d3" providerId="LiveId" clId="{624F5C8E-E1BF-4CE1-BB9B-76365F20EAEC}" dt="2024-12-07T23:37:08.273" v="1" actId="478"/>
+      <pc:docMkLst>
+        <pc:docMk/>
+      </pc:docMkLst>
+      <pc:sldChg chg="addSp delSp mod">
+        <pc:chgData name="Lupe Hernandez" userId="cc6101a617eae4d3" providerId="LiveId" clId="{624F5C8E-E1BF-4CE1-BB9B-76365F20EAEC}" dt="2024-12-07T23:37:08.273" v="1" actId="478"/>
+        <pc:sldMkLst>
+          <pc:docMk/>
+          <pc:sldMk cId="837402205" sldId="264"/>
+        </pc:sldMkLst>
+        <pc:graphicFrameChg chg="add del">
+          <ac:chgData name="Lupe Hernandez" userId="cc6101a617eae4d3" providerId="LiveId" clId="{624F5C8E-E1BF-4CE1-BB9B-76365F20EAEC}" dt="2024-12-07T23:37:08.273" v="1" actId="478"/>
+          <ac:graphicFrameMkLst>
+            <pc:docMk/>
+            <pc:sldMk cId="837402205" sldId="264"/>
+            <ac:graphicFrameMk id="8" creationId="{C1ED9FAA-1D04-B2D7-C68C-4EF225B14F6D}"/>
+          </ac:graphicFrameMkLst>
+        </pc:graphicFrameChg>
+      </pc:sldChg>
+    </pc:docChg>
+  </pc:docChgLst>
+</pc:chgInfo>
+</file>
+
 <file path=ppt/handoutMasters/handoutMaster1.xml><?xml version="1.0" encoding="utf-8"?>
 <p:handoutMaster xmlns:a="http://schemas.openxmlformats.org/drawingml/2006/main" xmlns:r="http://schemas.openxmlformats.org/officeDocument/2006/relationships" xmlns:p="http://schemas.openxmlformats.org/presentationml/2006/main">
   <p:cSld>
@@ -227,7 +256,7 @@
           <a:p>
             <a:fld id="{7B97C6B7-F63D-48F8-8C65-A57506B0F13B}" type="datetimeFigureOut">
               <a:rPr lang="en-US" smtClean="0"/>
-              <a:t>10/16/2024</a:t>
+              <a:t>12/7/2024</a:t>
             </a:fld>
             <a:endParaRPr lang="en-US" dirty="0"/>
           </a:p>
@@ -404,7 +433,7 @@
           <a:p>
             <a:fld id="{AC09A0FA-2191-4F92-A1E4-6EB4598AC4EC}" type="datetimeFigureOut">
               <a:rPr lang="en-US" smtClean="0"/>
-              <a:t>10/16/2024</a:t>
+              <a:t>12/7/2024</a:t>
             </a:fld>
             <a:endParaRPr lang="en-US" dirty="0"/>
           </a:p>
@@ -7301,7 +7330,13 @@
                   <p:embed/>
                   <p:pic>
                     <p:nvPicPr>
-                      <p:cNvPr id="0" name=""/>
+                      <p:cNvPr id="8" name="Object 7">
+                        <a:extLst>
+                          <a:ext uri="{FF2B5EF4-FFF2-40B4-BE49-F238E27FC236}">
+                            <a16:creationId xmlns:a16="http://schemas.microsoft.com/office/drawing/2014/main" id="{C1ED9FAA-1D04-B2D7-C68C-4EF225B14F6D}"/>
+                          </a:ext>
+                        </a:extLst>
+                      </p:cNvPr>
                       <p:cNvPicPr/>
                       <p:nvPr/>
                     </p:nvPicPr>
@@ -8346,6 +8381,35 @@
 </file>
 
 <file path=customXml/item1.xml><?xml version="1.0" encoding="utf-8"?>
+<p:properties xmlns:p="http://schemas.microsoft.com/office/2006/metadata/properties" xmlns:xsi="http://www.w3.org/2001/XMLSchema-instance" xmlns:pc="http://schemas.microsoft.com/office/infopath/2007/PartnerControls">
+  <documentManagement>
+    <_ip_UnifiedCompliancePolicyUIAction xmlns="http://schemas.microsoft.com/sharepoint/v3" xsi:nil="true"/>
+    <Image xmlns="71af3243-3dd4-4a8d-8c0d-dd76da1f02a5">
+      <Url xsi:nil="true"/>
+      <Description xsi:nil="true"/>
+    </Image>
+    <Status xmlns="71af3243-3dd4-4a8d-8c0d-dd76da1f02a5">Not started</Status>
+    <Background xmlns="71af3243-3dd4-4a8d-8c0d-dd76da1f02a5">false</Background>
+    <_ip_UnifiedCompliancePolicyProperties xmlns="http://schemas.microsoft.com/sharepoint/v3" xsi:nil="true"/>
+    <ImageTagsTaxHTField xmlns="71af3243-3dd4-4a8d-8c0d-dd76da1f02a5">
+      <Terms xmlns="http://schemas.microsoft.com/office/infopath/2007/PartnerControls"/>
+    </ImageTagsTaxHTField>
+    <TaxCatchAll xmlns="230e9df3-be65-4c73-a93b-d1236ebd677e" xsi:nil="true"/>
+    <MediaServiceKeyPoints xmlns="71af3243-3dd4-4a8d-8c0d-dd76da1f02a5" xsi:nil="true"/>
+  </documentManagement>
+</p:properties>
+</file>
+
+<file path=customXml/item2.xml><?xml version="1.0" encoding="utf-8"?>
+<?mso-contentType ?>
+<FormTemplates xmlns="http://schemas.microsoft.com/sharepoint/v3/contenttype/forms">
+  <Display>DocumentLibraryForm</Display>
+  <Edit>DocumentLibraryForm</Edit>
+  <New>DocumentLibraryForm</New>
+</FormTemplates>
+</file>
+
+<file path=customXml/item3.xml><?xml version="1.0" encoding="utf-8"?>
 <ct:contentTypeSchema xmlns:ct="http://schemas.microsoft.com/office/2006/metadata/contentType" xmlns:ma="http://schemas.microsoft.com/office/2006/metadata/properties/metaAttributes" ct:_="" ma:_="" ma:contentTypeName="Document" ma:contentTypeID="0x01010079F111ED35F8CC479449609E8A0923A6" ma:contentTypeVersion="28" ma:contentTypeDescription="Create a new document." ma:contentTypeScope="" ma:versionID="60f5a4f2d2b0abadcf532d48ebf9cb71">
   <xsd:schema xmlns:xsd="http://www.w3.org/2001/XMLSchema" xmlns:xs="http://www.w3.org/2001/XMLSchema" xmlns:p="http://schemas.microsoft.com/office/2006/metadata/properties" xmlns:ns1="http://schemas.microsoft.com/sharepoint/v3" xmlns:ns2="71af3243-3dd4-4a8d-8c0d-dd76da1f02a5" xmlns:ns3="16c05727-aa75-4e4a-9b5f-8a80a1165891" xmlns:ns4="230e9df3-be65-4c73-a93b-d1236ebd677e" targetNamespace="http://schemas.microsoft.com/office/2006/metadata/properties" ma:root="true" ma:fieldsID="7dd78129e6a1811f84807ad11c651531" ns1:_="" ns2:_="" ns3:_="" ns4:_="">
     <xsd:import namespace="http://schemas.microsoft.com/sharepoint/v3"/>
@@ -8657,36 +8721,27 @@
 </ct:contentTypeSchema>
 </file>
 
-<file path=customXml/item2.xml><?xml version="1.0" encoding="utf-8"?>
-<?mso-contentType ?>
-<FormTemplates xmlns="http://schemas.microsoft.com/sharepoint/v3/contenttype/forms">
-  <Display>DocumentLibraryForm</Display>
-  <Edit>DocumentLibraryForm</Edit>
-  <New>DocumentLibraryForm</New>
-</FormTemplates>
+<file path=customXml/itemProps1.xml><?xml version="1.0" encoding="utf-8"?>
+<ds:datastoreItem xmlns:ds="http://schemas.openxmlformats.org/officeDocument/2006/customXml" ds:itemID="{5A00B2AC-C335-4100-B8B3-2D9F49A72906}">
+  <ds:schemaRefs>
+    <ds:schemaRef ds:uri="http://schemas.microsoft.com/office/2006/metadata/properties"/>
+    <ds:schemaRef ds:uri="http://schemas.microsoft.com/office/infopath/2007/PartnerControls"/>
+    <ds:schemaRef ds:uri="http://schemas.microsoft.com/sharepoint/v3"/>
+    <ds:schemaRef ds:uri="71af3243-3dd4-4a8d-8c0d-dd76da1f02a5"/>
+    <ds:schemaRef ds:uri="230e9df3-be65-4c73-a93b-d1236ebd677e"/>
+  </ds:schemaRefs>
+</ds:datastoreItem>
 </file>
 
-<file path=customXml/item3.xml><?xml version="1.0" encoding="utf-8"?>
-<p:properties xmlns:p="http://schemas.microsoft.com/office/2006/metadata/properties" xmlns:xsi="http://www.w3.org/2001/XMLSchema-instance" xmlns:pc="http://schemas.microsoft.com/office/infopath/2007/PartnerControls">
-  <documentManagement>
-    <_ip_UnifiedCompliancePolicyUIAction xmlns="http://schemas.microsoft.com/sharepoint/v3" xsi:nil="true"/>
-    <Image xmlns="71af3243-3dd4-4a8d-8c0d-dd76da1f02a5">
-      <Url xsi:nil="true"/>
-      <Description xsi:nil="true"/>
-    </Image>
-    <Status xmlns="71af3243-3dd4-4a8d-8c0d-dd76da1f02a5">Not started</Status>
-    <Background xmlns="71af3243-3dd4-4a8d-8c0d-dd76da1f02a5">false</Background>
-    <_ip_UnifiedCompliancePolicyProperties xmlns="http://schemas.microsoft.com/sharepoint/v3" xsi:nil="true"/>
-    <ImageTagsTaxHTField xmlns="71af3243-3dd4-4a8d-8c0d-dd76da1f02a5">
-      <Terms xmlns="http://schemas.microsoft.com/office/infopath/2007/PartnerControls"/>
-    </ImageTagsTaxHTField>
-    <TaxCatchAll xmlns="230e9df3-be65-4c73-a93b-d1236ebd677e" xsi:nil="true"/>
-    <MediaServiceKeyPoints xmlns="71af3243-3dd4-4a8d-8c0d-dd76da1f02a5" xsi:nil="true"/>
-  </documentManagement>
-</p:properties>
+<file path=customXml/itemProps2.xml><?xml version="1.0" encoding="utf-8"?>
+<ds:datastoreItem xmlns:ds="http://schemas.openxmlformats.org/officeDocument/2006/customXml" ds:itemID="{19D1F84C-D1FD-4B1B-9CFD-8E0D96AC4DF2}">
+  <ds:schemaRefs>
+    <ds:schemaRef ds:uri="http://schemas.microsoft.com/sharepoint/v3/contenttype/forms"/>
+  </ds:schemaRefs>
+</ds:datastoreItem>
 </file>
 
-<file path=customXml/itemProps1.xml><?xml version="1.0" encoding="utf-8"?>
+<file path=customXml/itemProps3.xml><?xml version="1.0" encoding="utf-8"?>
 <ds:datastoreItem xmlns:ds="http://schemas.openxmlformats.org/officeDocument/2006/customXml" ds:itemID="{0037C456-A6DA-4DEE-A3FB-4EC3058FD086}">
   <ds:schemaRefs>
     <ds:schemaRef ds:uri="http://schemas.microsoft.com/office/2006/metadata/contentType"/>
@@ -8707,26 +8762,6 @@
 </ds:datastoreItem>
 </file>
 
-<file path=customXml/itemProps2.xml><?xml version="1.0" encoding="utf-8"?>
-<ds:datastoreItem xmlns:ds="http://schemas.openxmlformats.org/officeDocument/2006/customXml" ds:itemID="{19D1F84C-D1FD-4B1B-9CFD-8E0D96AC4DF2}">
-  <ds:schemaRefs>
-    <ds:schemaRef ds:uri="http://schemas.microsoft.com/sharepoint/v3/contenttype/forms"/>
-  </ds:schemaRefs>
-</ds:datastoreItem>
-</file>
-
-<file path=customXml/itemProps3.xml><?xml version="1.0" encoding="utf-8"?>
-<ds:datastoreItem xmlns:ds="http://schemas.openxmlformats.org/officeDocument/2006/customXml" ds:itemID="{5A00B2AC-C335-4100-B8B3-2D9F49A72906}">
-  <ds:schemaRefs>
-    <ds:schemaRef ds:uri="http://schemas.microsoft.com/office/2006/metadata/properties"/>
-    <ds:schemaRef ds:uri="http://schemas.microsoft.com/office/infopath/2007/PartnerControls"/>
-    <ds:schemaRef ds:uri="http://schemas.microsoft.com/sharepoint/v3"/>
-    <ds:schemaRef ds:uri="71af3243-3dd4-4a8d-8c0d-dd76da1f02a5"/>
-    <ds:schemaRef ds:uri="230e9df3-be65-4c73-a93b-d1236ebd677e"/>
-  </ds:schemaRefs>
-</ds:datastoreItem>
-</file>
-
 <file path=docMetadata/LabelInfo.xml><?xml version="1.0" encoding="utf-8"?>
 <clbl:labelList xmlns:clbl="http://schemas.microsoft.com/office/2020/mipLabelMetadata"/>
 </file>
</xml_diff>

<commit_message>
updated project presentation and gantt chart
</commit_message>
<xml_diff>
--- a/docs/CIS641_presentation_Hernandez.pptx
+++ b/docs/CIS641_presentation_Hernandez.pptx
@@ -7295,10 +7295,10 @@
       </p:grpSpPr>
       <p:graphicFrame>
         <p:nvGraphicFramePr>
-          <p:cNvPr id="8" name="Object 7">
+          <p:cNvPr id="2" name="Object 1">
             <a:extLst>
               <a:ext uri="{FF2B5EF4-FFF2-40B4-BE49-F238E27FC236}">
-                <a16:creationId xmlns:a16="http://schemas.microsoft.com/office/drawing/2014/main" id="{C1ED9FAA-1D04-B2D7-C68C-4EF225B14F6D}"/>
+                <a16:creationId xmlns:a16="http://schemas.microsoft.com/office/drawing/2014/main" id="{EB36011B-3893-6B08-C802-DC45121E91FD}"/>
               </a:ext>
             </a:extLst>
           </p:cNvPr>
@@ -7308,35 +7308,29 @@
           <p:nvPr>
             <p:extLst>
               <p:ext uri="{D42A27DB-BD31-4B8C-83A1-F6EECF244321}">
-                <p14:modId xmlns:p14="http://schemas.microsoft.com/office/powerpoint/2010/main" val="1710748652"/>
+                <p14:modId xmlns:p14="http://schemas.microsoft.com/office/powerpoint/2010/main" val="2140610937"/>
               </p:ext>
             </p:extLst>
           </p:nvPr>
         </p:nvGraphicFramePr>
         <p:xfrm>
-          <a:off x="1339799" y="498328"/>
-          <a:ext cx="7568227" cy="7521811"/>
+          <a:off x="2566409" y="536041"/>
+          <a:ext cx="7059181" cy="6321959"/>
         </p:xfrm>
         <a:graphic>
           <a:graphicData uri="http://schemas.openxmlformats.org/presentationml/2006/ole">
             <mc:AlternateContent xmlns:mc="http://schemas.openxmlformats.org/markup-compatibility/2006">
               <mc:Choice xmlns:v="urn:schemas-microsoft-com:vml" Requires="v">
-                <p:oleObj name="Worksheet" r:id="rId3" imgW="11970985" imgH="11864269" progId="Excel.Sheet.12">
+                <p:oleObj name="Worksheet" r:id="rId3" imgW="11970985" imgH="10721506" progId="Excel.Sheet.12">
                   <p:embed/>
                 </p:oleObj>
               </mc:Choice>
               <mc:Fallback>
-                <p:oleObj name="Worksheet" r:id="rId3" imgW="11970985" imgH="11864269" progId="Excel.Sheet.12">
+                <p:oleObj name="Worksheet" r:id="rId3" imgW="11970985" imgH="10721506" progId="Excel.Sheet.12">
                   <p:embed/>
                   <p:pic>
                     <p:nvPicPr>
-                      <p:cNvPr id="8" name="Object 7">
-                        <a:extLst>
-                          <a:ext uri="{FF2B5EF4-FFF2-40B4-BE49-F238E27FC236}">
-                            <a16:creationId xmlns:a16="http://schemas.microsoft.com/office/drawing/2014/main" id="{C1ED9FAA-1D04-B2D7-C68C-4EF225B14F6D}"/>
-                          </a:ext>
-                        </a:extLst>
-                      </p:cNvPr>
+                      <p:cNvPr id="0" name=""/>
                       <p:cNvPicPr/>
                       <p:nvPr/>
                     </p:nvPicPr>
@@ -7348,8 +7342,8 @@
                     </p:blipFill>
                     <p:spPr>
                       <a:xfrm>
-                        <a:off x="1339799" y="498328"/>
-                        <a:ext cx="7568227" cy="7521811"/>
+                        <a:off x="2566409" y="536041"/>
+                        <a:ext cx="7059181" cy="6321959"/>
                       </a:xfrm>
                       <a:prstGeom prst="rect">
                         <a:avLst/>
@@ -8381,35 +8375,6 @@
 </file>
 
 <file path=customXml/item1.xml><?xml version="1.0" encoding="utf-8"?>
-<p:properties xmlns:p="http://schemas.microsoft.com/office/2006/metadata/properties" xmlns:xsi="http://www.w3.org/2001/XMLSchema-instance" xmlns:pc="http://schemas.microsoft.com/office/infopath/2007/PartnerControls">
-  <documentManagement>
-    <_ip_UnifiedCompliancePolicyUIAction xmlns="http://schemas.microsoft.com/sharepoint/v3" xsi:nil="true"/>
-    <Image xmlns="71af3243-3dd4-4a8d-8c0d-dd76da1f02a5">
-      <Url xsi:nil="true"/>
-      <Description xsi:nil="true"/>
-    </Image>
-    <Status xmlns="71af3243-3dd4-4a8d-8c0d-dd76da1f02a5">Not started</Status>
-    <Background xmlns="71af3243-3dd4-4a8d-8c0d-dd76da1f02a5">false</Background>
-    <_ip_UnifiedCompliancePolicyProperties xmlns="http://schemas.microsoft.com/sharepoint/v3" xsi:nil="true"/>
-    <ImageTagsTaxHTField xmlns="71af3243-3dd4-4a8d-8c0d-dd76da1f02a5">
-      <Terms xmlns="http://schemas.microsoft.com/office/infopath/2007/PartnerControls"/>
-    </ImageTagsTaxHTField>
-    <TaxCatchAll xmlns="230e9df3-be65-4c73-a93b-d1236ebd677e" xsi:nil="true"/>
-    <MediaServiceKeyPoints xmlns="71af3243-3dd4-4a8d-8c0d-dd76da1f02a5" xsi:nil="true"/>
-  </documentManagement>
-</p:properties>
-</file>
-
-<file path=customXml/item2.xml><?xml version="1.0" encoding="utf-8"?>
-<?mso-contentType ?>
-<FormTemplates xmlns="http://schemas.microsoft.com/sharepoint/v3/contenttype/forms">
-  <Display>DocumentLibraryForm</Display>
-  <Edit>DocumentLibraryForm</Edit>
-  <New>DocumentLibraryForm</New>
-</FormTemplates>
-</file>
-
-<file path=customXml/item3.xml><?xml version="1.0" encoding="utf-8"?>
 <ct:contentTypeSchema xmlns:ct="http://schemas.microsoft.com/office/2006/metadata/contentType" xmlns:ma="http://schemas.microsoft.com/office/2006/metadata/properties/metaAttributes" ct:_="" ma:_="" ma:contentTypeName="Document" ma:contentTypeID="0x01010079F111ED35F8CC479449609E8A0923A6" ma:contentTypeVersion="28" ma:contentTypeDescription="Create a new document." ma:contentTypeScope="" ma:versionID="60f5a4f2d2b0abadcf532d48ebf9cb71">
   <xsd:schema xmlns:xsd="http://www.w3.org/2001/XMLSchema" xmlns:xs="http://www.w3.org/2001/XMLSchema" xmlns:p="http://schemas.microsoft.com/office/2006/metadata/properties" xmlns:ns1="http://schemas.microsoft.com/sharepoint/v3" xmlns:ns2="71af3243-3dd4-4a8d-8c0d-dd76da1f02a5" xmlns:ns3="16c05727-aa75-4e4a-9b5f-8a80a1165891" xmlns:ns4="230e9df3-be65-4c73-a93b-d1236ebd677e" targetNamespace="http://schemas.microsoft.com/office/2006/metadata/properties" ma:root="true" ma:fieldsID="7dd78129e6a1811f84807ad11c651531" ns1:_="" ns2:_="" ns3:_="" ns4:_="">
     <xsd:import namespace="http://schemas.microsoft.com/sharepoint/v3"/>
@@ -8721,27 +8686,36 @@
 </ct:contentTypeSchema>
 </file>
 
-<file path=customXml/itemProps1.xml><?xml version="1.0" encoding="utf-8"?>
-<ds:datastoreItem xmlns:ds="http://schemas.openxmlformats.org/officeDocument/2006/customXml" ds:itemID="{5A00B2AC-C335-4100-B8B3-2D9F49A72906}">
-  <ds:schemaRefs>
-    <ds:schemaRef ds:uri="http://schemas.microsoft.com/office/2006/metadata/properties"/>
-    <ds:schemaRef ds:uri="http://schemas.microsoft.com/office/infopath/2007/PartnerControls"/>
-    <ds:schemaRef ds:uri="http://schemas.microsoft.com/sharepoint/v3"/>
-    <ds:schemaRef ds:uri="71af3243-3dd4-4a8d-8c0d-dd76da1f02a5"/>
-    <ds:schemaRef ds:uri="230e9df3-be65-4c73-a93b-d1236ebd677e"/>
-  </ds:schemaRefs>
-</ds:datastoreItem>
+<file path=customXml/item2.xml><?xml version="1.0" encoding="utf-8"?>
+<?mso-contentType ?>
+<FormTemplates xmlns="http://schemas.microsoft.com/sharepoint/v3/contenttype/forms">
+  <Display>DocumentLibraryForm</Display>
+  <Edit>DocumentLibraryForm</Edit>
+  <New>DocumentLibraryForm</New>
+</FormTemplates>
 </file>
 
-<file path=customXml/itemProps2.xml><?xml version="1.0" encoding="utf-8"?>
-<ds:datastoreItem xmlns:ds="http://schemas.openxmlformats.org/officeDocument/2006/customXml" ds:itemID="{19D1F84C-D1FD-4B1B-9CFD-8E0D96AC4DF2}">
-  <ds:schemaRefs>
-    <ds:schemaRef ds:uri="http://schemas.microsoft.com/sharepoint/v3/contenttype/forms"/>
-  </ds:schemaRefs>
-</ds:datastoreItem>
+<file path=customXml/item3.xml><?xml version="1.0" encoding="utf-8"?>
+<p:properties xmlns:p="http://schemas.microsoft.com/office/2006/metadata/properties" xmlns:xsi="http://www.w3.org/2001/XMLSchema-instance" xmlns:pc="http://schemas.microsoft.com/office/infopath/2007/PartnerControls">
+  <documentManagement>
+    <_ip_UnifiedCompliancePolicyUIAction xmlns="http://schemas.microsoft.com/sharepoint/v3" xsi:nil="true"/>
+    <Image xmlns="71af3243-3dd4-4a8d-8c0d-dd76da1f02a5">
+      <Url xsi:nil="true"/>
+      <Description xsi:nil="true"/>
+    </Image>
+    <Status xmlns="71af3243-3dd4-4a8d-8c0d-dd76da1f02a5">Not started</Status>
+    <Background xmlns="71af3243-3dd4-4a8d-8c0d-dd76da1f02a5">false</Background>
+    <_ip_UnifiedCompliancePolicyProperties xmlns="http://schemas.microsoft.com/sharepoint/v3" xsi:nil="true"/>
+    <ImageTagsTaxHTField xmlns="71af3243-3dd4-4a8d-8c0d-dd76da1f02a5">
+      <Terms xmlns="http://schemas.microsoft.com/office/infopath/2007/PartnerControls"/>
+    </ImageTagsTaxHTField>
+    <TaxCatchAll xmlns="230e9df3-be65-4c73-a93b-d1236ebd677e" xsi:nil="true"/>
+    <MediaServiceKeyPoints xmlns="71af3243-3dd4-4a8d-8c0d-dd76da1f02a5" xsi:nil="true"/>
+  </documentManagement>
+</p:properties>
 </file>
 
-<file path=customXml/itemProps3.xml><?xml version="1.0" encoding="utf-8"?>
+<file path=customXml/itemProps1.xml><?xml version="1.0" encoding="utf-8"?>
 <ds:datastoreItem xmlns:ds="http://schemas.openxmlformats.org/officeDocument/2006/customXml" ds:itemID="{0037C456-A6DA-4DEE-A3FB-4EC3058FD086}">
   <ds:schemaRefs>
     <ds:schemaRef ds:uri="http://schemas.microsoft.com/office/2006/metadata/contentType"/>
@@ -8762,6 +8736,26 @@
 </ds:datastoreItem>
 </file>
 
+<file path=customXml/itemProps2.xml><?xml version="1.0" encoding="utf-8"?>
+<ds:datastoreItem xmlns:ds="http://schemas.openxmlformats.org/officeDocument/2006/customXml" ds:itemID="{19D1F84C-D1FD-4B1B-9CFD-8E0D96AC4DF2}">
+  <ds:schemaRefs>
+    <ds:schemaRef ds:uri="http://schemas.microsoft.com/sharepoint/v3/contenttype/forms"/>
+  </ds:schemaRefs>
+</ds:datastoreItem>
+</file>
+
+<file path=customXml/itemProps3.xml><?xml version="1.0" encoding="utf-8"?>
+<ds:datastoreItem xmlns:ds="http://schemas.openxmlformats.org/officeDocument/2006/customXml" ds:itemID="{5A00B2AC-C335-4100-B8B3-2D9F49A72906}">
+  <ds:schemaRefs>
+    <ds:schemaRef ds:uri="http://schemas.microsoft.com/office/2006/metadata/properties"/>
+    <ds:schemaRef ds:uri="http://schemas.microsoft.com/office/infopath/2007/PartnerControls"/>
+    <ds:schemaRef ds:uri="http://schemas.microsoft.com/sharepoint/v3"/>
+    <ds:schemaRef ds:uri="71af3243-3dd4-4a8d-8c0d-dd76da1f02a5"/>
+    <ds:schemaRef ds:uri="230e9df3-be65-4c73-a93b-d1236ebd677e"/>
+  </ds:schemaRefs>
+</ds:datastoreItem>
+</file>
+
 <file path=docMetadata/LabelInfo.xml><?xml version="1.0" encoding="utf-8"?>
 <clbl:labelList xmlns:clbl="http://schemas.microsoft.com/office/2020/mipLabelMetadata"/>
 </file>
</xml_diff>